<commit_message>
update install ros2 humble rpi
</commit_message>
<xml_diff>
--- a/Tutorial/02-Week/robert/Turtlebot_02_robert.pptx
+++ b/Tutorial/02-Week/robert/Turtlebot_02_robert.pptx
@@ -13907,6 +13907,378 @@
           </a:p>
         </p:txBody>
       </p:sp>
+      <p:sp>
+        <p:nvSpPr>
+          <p:cNvPr id="2" name="Rectangle 1">
+            <a:extLst>
+              <a:ext uri="{FF2B5EF4-FFF2-40B4-BE49-F238E27FC236}">
+                <a16:creationId xmlns:a16="http://schemas.microsoft.com/office/drawing/2014/main" id="{28A648A7-39D8-87FE-0704-C31C59054D28}"/>
+              </a:ext>
+            </a:extLst>
+          </p:cNvPr>
+          <p:cNvSpPr>
+            <a:spLocks noChangeArrowheads="1"/>
+          </p:cNvSpPr>
+          <p:nvPr/>
+        </p:nvSpPr>
+        <p:spPr bwMode="auto">
+          <a:xfrm>
+            <a:off x="344794" y="2290814"/>
+            <a:ext cx="9362983" cy="1077218"/>
+          </a:xfrm>
+          <a:prstGeom prst="rect">
+            <a:avLst/>
+          </a:prstGeom>
+          <a:solidFill>
+            <a:srgbClr val="000000"/>
+          </a:solidFill>
+          <a:ln>
+            <a:noFill/>
+          </a:ln>
+          <a:effectLst/>
+          <a:extLst>
+            <a:ext uri="{91240B29-F687-4F45-9708-019B960494DF}">
+              <a14:hiddenLine xmlns:a14="http://schemas.microsoft.com/office/drawing/2010/main" w="9525">
+                <a:solidFill>
+                  <a:schemeClr val="tx1"/>
+                </a:solidFill>
+                <a:miter lim="800000"/>
+                <a:headEnd/>
+                <a:tailEnd/>
+              </a14:hiddenLine>
+            </a:ext>
+            <a:ext uri="{AF507438-7753-43E0-B8FC-AC1667EBCBE1}">
+              <a14:hiddenEffects xmlns:a14="http://schemas.microsoft.com/office/drawing/2010/main">
+                <a:effectLst>
+                  <a:outerShdw dist="35921" dir="2700000" algn="ctr" rotWithShape="0">
+                    <a:schemeClr val="bg2"/>
+                  </a:outerShdw>
+                </a:effectLst>
+              </a14:hiddenEffects>
+            </a:ext>
+          </a:extLst>
+        </p:spPr>
+        <p:txBody>
+          <a:bodyPr vert="horz" wrap="square" lIns="0" tIns="0" rIns="0" bIns="0" numCol="1" anchor="ctr" anchorCtr="0" compatLnSpc="1">
+            <a:prstTxWarp prst="textNoShape">
+              <a:avLst/>
+            </a:prstTxWarp>
+            <a:spAutoFit/>
+          </a:bodyPr>
+          <a:lstStyle/>
+          <a:p>
+            <a:pPr marL="0" marR="0" lvl="0" indent="0" algn="l" defTabSz="914400" rtl="0" eaLnBrk="0" fontAlgn="base" latinLnBrk="0" hangingPunct="0">
+              <a:lnSpc>
+                <a:spcPct val="100000"/>
+              </a:lnSpc>
+              <a:spcBef>
+                <a:spcPct val="0"/>
+              </a:spcBef>
+              <a:spcAft>
+                <a:spcPct val="0"/>
+              </a:spcAft>
+              <a:buClrTx/>
+              <a:buSzTx/>
+              <a:buFontTx/>
+              <a:buNone/>
+              <a:tabLst/>
+            </a:pPr>
+            <a:endParaRPr kumimoji="0" lang="en-US" altLang="ko-KR" sz="1000" b="0" i="0" u="none" strike="noStrike" cap="none" normalizeH="0" baseline="0" dirty="0">
+              <a:ln>
+                <a:noFill/>
+              </a:ln>
+              <a:solidFill>
+                <a:srgbClr val="22B3EB"/>
+              </a:solidFill>
+              <a:effectLst/>
+              <a:latin typeface="Arial Unicode MS"/>
+            </a:endParaRPr>
+          </a:p>
+          <a:p>
+            <a:pPr marL="0" marR="0" lvl="0" indent="0" algn="l" defTabSz="914400" rtl="0" eaLnBrk="0" fontAlgn="base" latinLnBrk="0" hangingPunct="0">
+              <a:lnSpc>
+                <a:spcPct val="100000"/>
+              </a:lnSpc>
+              <a:spcBef>
+                <a:spcPct val="0"/>
+              </a:spcBef>
+              <a:spcAft>
+                <a:spcPct val="0"/>
+              </a:spcAft>
+              <a:buClrTx/>
+              <a:buSzTx/>
+              <a:buFontTx/>
+              <a:buNone/>
+              <a:tabLst/>
+            </a:pPr>
+            <a:r>
+              <a:rPr kumimoji="0" lang="en-US" altLang="ko-KR" sz="1000" b="0" i="0" u="none" strike="noStrike" cap="none" normalizeH="0" baseline="0" dirty="0">
+                <a:ln>
+                  <a:noFill/>
+                </a:ln>
+                <a:solidFill>
+                  <a:srgbClr val="22B3EB"/>
+                </a:solidFill>
+                <a:effectLst/>
+                <a:latin typeface="Arial Unicode MS"/>
+              </a:rPr>
+              <a:t>$ </a:t>
+            </a:r>
+            <a:r>
+              <a:rPr kumimoji="0" lang="en-US" altLang="ko-KR" sz="1000" b="0" i="0" u="none" strike="noStrike" cap="none" normalizeH="0" baseline="0" dirty="0" err="1">
+                <a:ln>
+                  <a:noFill/>
+                </a:ln>
+                <a:solidFill>
+                  <a:srgbClr val="22B3EB"/>
+                </a:solidFill>
+                <a:effectLst/>
+                <a:latin typeface="Arial Unicode MS"/>
+              </a:rPr>
+              <a:t>sudo</a:t>
+            </a:r>
+            <a:r>
+              <a:rPr kumimoji="0" lang="en-US" altLang="ko-KR" sz="1000" b="0" i="0" u="none" strike="noStrike" cap="none" normalizeH="0" baseline="0" dirty="0">
+                <a:ln>
+                  <a:noFill/>
+                </a:ln>
+                <a:solidFill>
+                  <a:srgbClr val="22B3EB"/>
+                </a:solidFill>
+                <a:effectLst/>
+                <a:latin typeface="Arial Unicode MS"/>
+              </a:rPr>
+              <a:t> apt-get update</a:t>
+            </a:r>
+          </a:p>
+          <a:p>
+            <a:pPr marL="0" marR="0" lvl="0" indent="0" algn="l" defTabSz="914400" rtl="0" eaLnBrk="0" fontAlgn="base" latinLnBrk="0" hangingPunct="0">
+              <a:lnSpc>
+                <a:spcPct val="100000"/>
+              </a:lnSpc>
+              <a:spcBef>
+                <a:spcPct val="0"/>
+              </a:spcBef>
+              <a:spcAft>
+                <a:spcPct val="0"/>
+              </a:spcAft>
+              <a:buClrTx/>
+              <a:buSzTx/>
+              <a:buFontTx/>
+              <a:buNone/>
+              <a:tabLst/>
+            </a:pPr>
+            <a:r>
+              <a:rPr kumimoji="0" lang="en-US" altLang="ko-KR" sz="1000" b="0" i="0" u="none" strike="noStrike" cap="none" normalizeH="0" baseline="0" dirty="0">
+                <a:ln>
+                  <a:noFill/>
+                </a:ln>
+                <a:solidFill>
+                  <a:srgbClr val="22B3EB"/>
+                </a:solidFill>
+                <a:effectLst/>
+                <a:latin typeface="Arial Unicode MS"/>
+              </a:rPr>
+              <a:t>$ </a:t>
+            </a:r>
+            <a:r>
+              <a:rPr kumimoji="0" lang="en-US" altLang="ko-KR" sz="1000" b="0" i="0" u="none" strike="noStrike" cap="none" normalizeH="0" baseline="0" dirty="0" err="1">
+                <a:ln>
+                  <a:noFill/>
+                </a:ln>
+                <a:solidFill>
+                  <a:srgbClr val="22B3EB"/>
+                </a:solidFill>
+                <a:effectLst/>
+                <a:latin typeface="Arial Unicode MS"/>
+              </a:rPr>
+              <a:t>sudo</a:t>
+            </a:r>
+            <a:r>
+              <a:rPr kumimoji="0" lang="en-US" altLang="ko-KR" sz="1000" b="0" i="0" u="none" strike="noStrike" cap="none" normalizeH="0" baseline="0" dirty="0">
+                <a:ln>
+                  <a:noFill/>
+                </a:ln>
+                <a:solidFill>
+                  <a:srgbClr val="22B3EB"/>
+                </a:solidFill>
+                <a:effectLst/>
+                <a:latin typeface="Arial Unicode MS"/>
+              </a:rPr>
+              <a:t> apt-get upgrade</a:t>
+            </a:r>
+          </a:p>
+          <a:p>
+            <a:pPr marL="0" marR="0" lvl="0" indent="0" algn="l" defTabSz="914400" rtl="0" eaLnBrk="0" fontAlgn="base" latinLnBrk="0" hangingPunct="0">
+              <a:lnSpc>
+                <a:spcPct val="100000"/>
+              </a:lnSpc>
+              <a:spcBef>
+                <a:spcPct val="0"/>
+              </a:spcBef>
+              <a:spcAft>
+                <a:spcPct val="0"/>
+              </a:spcAft>
+              <a:buClrTx/>
+              <a:buSzTx/>
+              <a:buFontTx/>
+              <a:buNone/>
+              <a:tabLst/>
+            </a:pPr>
+            <a:r>
+              <a:rPr kumimoji="0" lang="en-US" altLang="ko-KR" sz="1000" b="0" i="0" u="none" strike="noStrike" cap="none" normalizeH="0" baseline="0" dirty="0">
+                <a:ln>
+                  <a:noFill/>
+                </a:ln>
+                <a:solidFill>
+                  <a:srgbClr val="22B3EB"/>
+                </a:solidFill>
+                <a:effectLst/>
+                <a:latin typeface="Arial Unicode MS"/>
+              </a:rPr>
+              <a:t>$ </a:t>
+            </a:r>
+            <a:r>
+              <a:rPr kumimoji="0" lang="en-US" altLang="ko-KR" sz="1000" b="0" i="0" u="none" strike="noStrike" cap="none" normalizeH="0" baseline="0" dirty="0" err="1">
+                <a:ln>
+                  <a:noFill/>
+                </a:ln>
+                <a:solidFill>
+                  <a:srgbClr val="22B3EB"/>
+                </a:solidFill>
+                <a:effectLst/>
+                <a:latin typeface="Arial Unicode MS"/>
+              </a:rPr>
+              <a:t>wget</a:t>
+            </a:r>
+            <a:r>
+              <a:rPr kumimoji="0" lang="en-US" altLang="ko-KR" sz="1000" b="0" i="0" u="none" strike="noStrike" cap="none" normalizeH="0" baseline="0" dirty="0">
+                <a:ln>
+                  <a:noFill/>
+                </a:ln>
+                <a:solidFill>
+                  <a:srgbClr val="22B3EB"/>
+                </a:solidFill>
+                <a:effectLst/>
+                <a:latin typeface="Arial Unicode MS"/>
+              </a:rPr>
+              <a:t> https://raw.githubusercontent.com/orocapangyo/turtlebot/blob/main/Tutorial/02-Week/robert/install_ros2_humble_rpi.sh</a:t>
+            </a:r>
+          </a:p>
+          <a:p>
+            <a:pPr marL="0" marR="0" lvl="0" indent="0" algn="l" defTabSz="914400" rtl="0" eaLnBrk="0" fontAlgn="base" latinLnBrk="0" hangingPunct="0">
+              <a:lnSpc>
+                <a:spcPct val="100000"/>
+              </a:lnSpc>
+              <a:spcBef>
+                <a:spcPct val="0"/>
+              </a:spcBef>
+              <a:spcAft>
+                <a:spcPct val="0"/>
+              </a:spcAft>
+              <a:buClrTx/>
+              <a:buSzTx/>
+              <a:buFontTx/>
+              <a:buNone/>
+              <a:tabLst/>
+            </a:pPr>
+            <a:r>
+              <a:rPr kumimoji="0" lang="en-US" altLang="ko-KR" sz="1000" b="0" i="0" u="none" strike="noStrike" cap="none" normalizeH="0" baseline="0" dirty="0">
+                <a:ln>
+                  <a:noFill/>
+                </a:ln>
+                <a:solidFill>
+                  <a:srgbClr val="22B3EB"/>
+                </a:solidFill>
+                <a:effectLst/>
+                <a:latin typeface="Arial Unicode MS"/>
+              </a:rPr>
+              <a:t>$ </a:t>
+            </a:r>
+            <a:r>
+              <a:rPr kumimoji="0" lang="en-US" altLang="ko-KR" sz="1000" b="0" i="0" u="none" strike="noStrike" cap="none" normalizeH="0" baseline="0" dirty="0" err="1">
+                <a:ln>
+                  <a:noFill/>
+                </a:ln>
+                <a:solidFill>
+                  <a:srgbClr val="22B3EB"/>
+                </a:solidFill>
+                <a:effectLst/>
+                <a:latin typeface="Arial Unicode MS"/>
+              </a:rPr>
+              <a:t>chmod</a:t>
+            </a:r>
+            <a:r>
+              <a:rPr kumimoji="0" lang="en-US" altLang="ko-KR" sz="1000" b="0" i="0" u="none" strike="noStrike" cap="none" normalizeH="0" baseline="0" dirty="0">
+                <a:ln>
+                  <a:noFill/>
+                </a:ln>
+                <a:solidFill>
+                  <a:srgbClr val="22B3EB"/>
+                </a:solidFill>
+                <a:effectLst/>
+                <a:latin typeface="Arial Unicode MS"/>
+              </a:rPr>
+              <a:t> 755 ./install_ros2_humble_rpi.sh </a:t>
+            </a:r>
+          </a:p>
+          <a:p>
+            <a:pPr marL="0" marR="0" lvl="0" indent="0" algn="l" defTabSz="914400" rtl="0" eaLnBrk="0" fontAlgn="base" latinLnBrk="0" hangingPunct="0">
+              <a:lnSpc>
+                <a:spcPct val="100000"/>
+              </a:lnSpc>
+              <a:spcBef>
+                <a:spcPct val="0"/>
+              </a:spcBef>
+              <a:spcAft>
+                <a:spcPct val="0"/>
+              </a:spcAft>
+              <a:buClrTx/>
+              <a:buSzTx/>
+              <a:buFontTx/>
+              <a:buNone/>
+              <a:tabLst/>
+            </a:pPr>
+            <a:r>
+              <a:rPr kumimoji="0" lang="en-US" altLang="ko-KR" sz="1000" b="0" i="0" u="none" strike="noStrike" cap="none" normalizeH="0" baseline="0" dirty="0">
+                <a:ln>
+                  <a:noFill/>
+                </a:ln>
+                <a:solidFill>
+                  <a:srgbClr val="22B3EB"/>
+                </a:solidFill>
+                <a:effectLst/>
+                <a:latin typeface="Arial Unicode MS"/>
+              </a:rPr>
+              <a:t>$ bash ./install_ros2_humble_rpi.sh</a:t>
+            </a:r>
+          </a:p>
+          <a:p>
+            <a:pPr marL="0" marR="0" lvl="0" indent="0" algn="l" defTabSz="914400" rtl="0" eaLnBrk="0" fontAlgn="base" latinLnBrk="0" hangingPunct="0">
+              <a:lnSpc>
+                <a:spcPct val="100000"/>
+              </a:lnSpc>
+              <a:spcBef>
+                <a:spcPct val="0"/>
+              </a:spcBef>
+              <a:spcAft>
+                <a:spcPct val="0"/>
+              </a:spcAft>
+              <a:buClrTx/>
+              <a:buSzTx/>
+              <a:buFontTx/>
+              <a:buNone/>
+              <a:tabLst/>
+            </a:pPr>
+            <a:endParaRPr lang="en-US" altLang="ko-KR" sz="1000" dirty="0">
+              <a:solidFill>
+                <a:srgbClr val="22B3EB"/>
+              </a:solidFill>
+              <a:latin typeface="Arial Unicode MS"/>
+            </a:endParaRPr>
+          </a:p>
+        </p:txBody>
+      </p:sp>
     </p:spTree>
     <p:extLst>
       <p:ext uri="{BB962C8B-B14F-4D97-AF65-F5344CB8AC3E}">

</xml_diff>